<commit_message>
Siap sidang + slide revised
</commit_message>
<xml_diff>
--- a/DailyNeeds.co.id/LAPORAN/SIDANG/DOKUMEN/Slide Sidang Nicolas Novian Ruslim1.pptx
+++ b/DailyNeeds.co.id/LAPORAN/SIDANG/DOKUMEN/Slide Sidang Nicolas Novian Ruslim1.pptx
@@ -374,7 +374,7 @@
           <a:p>
             <a:fld id="{DF2DE5DD-71EB-4BD0-B096-7F7C943ABD72}" type="datetimeFigureOut">
               <a:rPr lang="id-ID" smtClean="0"/>
-              <a:t>11/08/2015</a:t>
+              <a:t>13/08/2015</a:t>
             </a:fld>
             <a:endParaRPr lang="id-ID"/>
           </a:p>
@@ -582,7 +582,7 @@
           <a:p>
             <a:fld id="{DF2DE5DD-71EB-4BD0-B096-7F7C943ABD72}" type="datetimeFigureOut">
               <a:rPr lang="id-ID" smtClean="0"/>
-              <a:t>11/08/2015</a:t>
+              <a:t>13/08/2015</a:t>
             </a:fld>
             <a:endParaRPr lang="id-ID"/>
           </a:p>
@@ -838,7 +838,7 @@
           <a:p>
             <a:fld id="{DF2DE5DD-71EB-4BD0-B096-7F7C943ABD72}" type="datetimeFigureOut">
               <a:rPr lang="id-ID" smtClean="0"/>
-              <a:t>11/08/2015</a:t>
+              <a:t>13/08/2015</a:t>
             </a:fld>
             <a:endParaRPr lang="id-ID"/>
           </a:p>
@@ -1012,7 +1012,7 @@
           <a:p>
             <a:fld id="{DF2DE5DD-71EB-4BD0-B096-7F7C943ABD72}" type="datetimeFigureOut">
               <a:rPr lang="id-ID" smtClean="0"/>
-              <a:t>11/08/2015</a:t>
+              <a:t>13/08/2015</a:t>
             </a:fld>
             <a:endParaRPr lang="id-ID"/>
           </a:p>
@@ -1355,7 +1355,7 @@
           <a:p>
             <a:fld id="{DF2DE5DD-71EB-4BD0-B096-7F7C943ABD72}" type="datetimeFigureOut">
               <a:rPr lang="id-ID" smtClean="0"/>
-              <a:t>11/08/2015</a:t>
+              <a:t>13/08/2015</a:t>
             </a:fld>
             <a:endParaRPr lang="id-ID"/>
           </a:p>
@@ -1630,7 +1630,7 @@
           <a:p>
             <a:fld id="{DF2DE5DD-71EB-4BD0-B096-7F7C943ABD72}" type="datetimeFigureOut">
               <a:rPr lang="id-ID" smtClean="0"/>
-              <a:t>11/08/2015</a:t>
+              <a:t>13/08/2015</a:t>
             </a:fld>
             <a:endParaRPr lang="id-ID"/>
           </a:p>
@@ -2009,7 +2009,7 @@
           <a:p>
             <a:fld id="{DF2DE5DD-71EB-4BD0-B096-7F7C943ABD72}" type="datetimeFigureOut">
               <a:rPr lang="id-ID" smtClean="0"/>
-              <a:t>11/08/2015</a:t>
+              <a:t>13/08/2015</a:t>
             </a:fld>
             <a:endParaRPr lang="id-ID"/>
           </a:p>
@@ -2127,7 +2127,7 @@
           <a:p>
             <a:fld id="{DF2DE5DD-71EB-4BD0-B096-7F7C943ABD72}" type="datetimeFigureOut">
               <a:rPr lang="id-ID" smtClean="0"/>
-              <a:t>11/08/2015</a:t>
+              <a:t>13/08/2015</a:t>
             </a:fld>
             <a:endParaRPr lang="id-ID"/>
           </a:p>
@@ -2298,7 +2298,7 @@
           <a:p>
             <a:fld id="{DF2DE5DD-71EB-4BD0-B096-7F7C943ABD72}" type="datetimeFigureOut">
               <a:rPr lang="id-ID" smtClean="0"/>
-              <a:t>11/08/2015</a:t>
+              <a:t>13/08/2015</a:t>
             </a:fld>
             <a:endParaRPr lang="id-ID"/>
           </a:p>
@@ -2652,7 +2652,7 @@
           <a:p>
             <a:fld id="{DF2DE5DD-71EB-4BD0-B096-7F7C943ABD72}" type="datetimeFigureOut">
               <a:rPr lang="id-ID" smtClean="0"/>
-              <a:t>11/08/2015</a:t>
+              <a:t>13/08/2015</a:t>
             </a:fld>
             <a:endParaRPr lang="id-ID"/>
           </a:p>
@@ -3034,7 +3034,7 @@
           <a:p>
             <a:fld id="{DF2DE5DD-71EB-4BD0-B096-7F7C943ABD72}" type="datetimeFigureOut">
               <a:rPr lang="id-ID" smtClean="0"/>
-              <a:t>11/08/2015</a:t>
+              <a:t>13/08/2015</a:t>
             </a:fld>
             <a:endParaRPr lang="id-ID"/>
           </a:p>
@@ -3321,7 +3321,7 @@
           <a:p>
             <a:fld id="{DF2DE5DD-71EB-4BD0-B096-7F7C943ABD72}" type="datetimeFigureOut">
               <a:rPr lang="id-ID" smtClean="0"/>
-              <a:t>11/08/2015</a:t>
+              <a:t>13/08/2015</a:t>
             </a:fld>
             <a:endParaRPr lang="id-ID"/>
           </a:p>
@@ -3891,14 +3891,7 @@
                 <a:latin typeface="Browallia New" panose="020B0604020202020204" pitchFamily="34" charset="-34"/>
                 <a:cs typeface="Browallia New" panose="020B0604020202020204" pitchFamily="34" charset="-34"/>
               </a:rPr>
-              <a:t> </a:t>
-            </a:r>
-            <a:r>
-              <a:rPr lang="id-ID" sz="3200" dirty="0" smtClean="0">
-                <a:latin typeface="Browallia New" panose="020B0604020202020204" pitchFamily="34" charset="-34"/>
-                <a:cs typeface="Browallia New" panose="020B0604020202020204" pitchFamily="34" charset="-34"/>
-              </a:rPr>
-              <a:t>Sistem Rekomendasi E-Commerce Penjualan Produk Makanan dan Minuman Dengan Mempertimbangkan Kondisi Kesehatan dan Larangan Konsumsi Makanan</a:t>
+              <a:t> Sistem Rekomendasi E-Commerce Penjualan Produk Makanan dan Minuman Dengan Mempertimbangkan Kondisi Kesehatan dan Larangan Konsumsi Makanan</a:t>
             </a:r>
             <a:endParaRPr lang="id-ID" sz="3200" dirty="0">
               <a:latin typeface="Browallia New" panose="020B0604020202020204" pitchFamily="34" charset="-34"/>
@@ -3997,14 +3990,7 @@
                 <a:latin typeface="Browallia New" panose="020B0604020202020204" pitchFamily="34" charset="-34"/>
                 <a:cs typeface="Browallia New" panose="020B0604020202020204" pitchFamily="34" charset="-34"/>
               </a:rPr>
-              <a:t> </a:t>
-            </a:r>
-            <a:r>
-              <a:rPr lang="id-ID" sz="4400" dirty="0" smtClean="0">
-                <a:latin typeface="Browallia New" panose="020B0604020202020204" pitchFamily="34" charset="-34"/>
-                <a:cs typeface="Browallia New" panose="020B0604020202020204" pitchFamily="34" charset="-34"/>
-              </a:rPr>
-              <a:t>TUGAS AKHIR 1</a:t>
+              <a:t> TUGAS AKHIR 1</a:t>
             </a:r>
             <a:endParaRPr lang="id-ID" sz="4400" dirty="0">
               <a:latin typeface="Browallia New" panose="020B0604020202020204" pitchFamily="34" charset="-34"/>
@@ -4209,14 +4195,7 @@
                 <a:latin typeface="Browallia New" panose="020B0604020202020204" pitchFamily="34" charset="-34"/>
                 <a:cs typeface="Browallia New" panose="020B0604020202020204" pitchFamily="34" charset="-34"/>
               </a:rPr>
-              <a:t>Kebutuhan </a:t>
-            </a:r>
-            <a:r>
-              <a:rPr lang="id-ID" dirty="0" smtClean="0">
-                <a:latin typeface="Browallia New" panose="020B0604020202020204" pitchFamily="34" charset="-34"/>
-                <a:cs typeface="Browallia New" panose="020B0604020202020204" pitchFamily="34" charset="-34"/>
-              </a:rPr>
-              <a:t>Fungsional</a:t>
+              <a:t>Kebutuhan Fungsional</a:t>
             </a:r>
             <a:endParaRPr lang="id-ID" dirty="0">
               <a:latin typeface="Browallia New" panose="020B0604020202020204" pitchFamily="34" charset="-34"/>
@@ -6069,8 +6048,8 @@
           </a:p>
         </p:txBody>
       </p:sp>
-      <mc:AlternateContent xmlns:mc="http://schemas.openxmlformats.org/markup-compatibility/2006">
-        <mc:Choice xmlns:a14="http://schemas.microsoft.com/office/drawing/2010/main" Requires="a14">
+      <mc:AlternateContent xmlns:mc="http://schemas.openxmlformats.org/markup-compatibility/2006" xmlns:a14="http://schemas.microsoft.com/office/drawing/2010/main">
+        <mc:Choice Requires="a14">
           <p:sp>
             <p:nvSpPr>
               <p:cNvPr id="8" name="Rectangle 7"/>
@@ -6092,6 +6071,7 @@
               </a:bodyPr>
               <a:lstStyle/>
               <a:p>
+                <a:pPr/>
                 <a14:m>
                   <m:oMathPara xmlns:m="http://schemas.openxmlformats.org/officeDocument/2006/math">
                     <m:oMathParaPr>
@@ -6381,7 +6361,7 @@
             </p:txBody>
           </p:sp>
         </mc:Choice>
-        <mc:Fallback>
+        <mc:Fallback xmlns="">
           <p:sp>
             <p:nvSpPr>
               <p:cNvPr id="8" name="Rectangle 7"/>
@@ -6985,8 +6965,8 @@
           </a:p>
         </p:txBody>
       </p:sp>
-      <mc:AlternateContent xmlns:mc="http://schemas.openxmlformats.org/markup-compatibility/2006">
-        <mc:Choice xmlns:a14="http://schemas.microsoft.com/office/drawing/2010/main" Requires="a14">
+      <mc:AlternateContent xmlns:mc="http://schemas.openxmlformats.org/markup-compatibility/2006" xmlns:a14="http://schemas.microsoft.com/office/drawing/2010/main">
+        <mc:Choice Requires="a14">
           <p:sp>
             <p:nvSpPr>
               <p:cNvPr id="5" name="Rectangle 4"/>
@@ -7008,6 +6988,7 @@
               </a:bodyPr>
               <a:lstStyle/>
               <a:p>
+                <a:pPr/>
                 <a14:m>
                   <m:oMathPara xmlns:m="http://schemas.openxmlformats.org/officeDocument/2006/math">
                     <m:oMathParaPr>
@@ -7017,7 +6998,7 @@
                       <m:sSub>
                         <m:sSubPr>
                           <m:ctrlPr>
-                            <a:rPr lang="en-US" sz="3200">
+                            <a:rPr lang="en-US" sz="3200" i="1">
                               <a:latin typeface="Cambria Math" panose="02040503050406030204" pitchFamily="18" charset="0"/>
                             </a:rPr>
                           </m:ctrlPr>
@@ -7400,7 +7381,7 @@
             </p:txBody>
           </p:sp>
         </mc:Choice>
-        <mc:Fallback>
+        <mc:Fallback xmlns="">
           <p:sp>
             <p:nvSpPr>
               <p:cNvPr id="5" name="Rectangle 4"/>
@@ -7439,8 +7420,8 @@
           </p:sp>
         </mc:Fallback>
       </mc:AlternateContent>
-      <mc:AlternateContent xmlns:mc="http://schemas.openxmlformats.org/markup-compatibility/2006">
-        <mc:Choice xmlns:a14="http://schemas.microsoft.com/office/drawing/2010/main" Requires="a14">
+      <mc:AlternateContent xmlns:mc="http://schemas.openxmlformats.org/markup-compatibility/2006" xmlns:a14="http://schemas.microsoft.com/office/drawing/2010/main">
+        <mc:Choice Requires="a14">
           <p:sp>
             <p:nvSpPr>
               <p:cNvPr id="3" name="TextBox 2"/>
@@ -7471,26 +7452,36 @@
                     <m:sSub>
                       <m:sSubPr>
                         <m:ctrlPr>
-                          <a:rPr lang="en-US" b="1" i="1"/>
+                          <a:rPr lang="en-US" b="1" i="1">
+                            <a:latin typeface="Cambria Math" panose="02040503050406030204" pitchFamily="18" charset="0"/>
+                          </a:rPr>
                         </m:ctrlPr>
                       </m:sSubPr>
                       <m:e>
                         <m:r>
-                          <a:rPr lang="en-US" b="1" i="1"/>
+                          <a:rPr lang="en-US" b="1" i="1">
+                            <a:latin typeface="Cambria Math" panose="02040503050406030204" pitchFamily="18" charset="0"/>
+                          </a:rPr>
                           <m:t>𝑺</m:t>
                         </m:r>
                       </m:e>
                       <m:sub>
                         <m:r>
-                          <a:rPr lang="en-US" b="1" i="1"/>
+                          <a:rPr lang="en-US" b="1" i="1">
+                            <a:latin typeface="Cambria Math" panose="02040503050406030204" pitchFamily="18" charset="0"/>
+                          </a:rPr>
                           <m:t>𝒊</m:t>
                         </m:r>
                         <m:r>
-                          <a:rPr lang="en-US" b="1" i="1"/>
+                          <a:rPr lang="en-US" b="1" i="1">
+                            <a:latin typeface="Cambria Math" panose="02040503050406030204" pitchFamily="18" charset="0"/>
+                          </a:rPr>
                           <m:t>,</m:t>
                         </m:r>
                         <m:r>
-                          <a:rPr lang="en-US" b="1" i="1"/>
+                          <a:rPr lang="en-US" b="1" i="1">
+                            <a:latin typeface="Cambria Math" panose="02040503050406030204" pitchFamily="18" charset="0"/>
+                          </a:rPr>
                           <m:t>𝑵</m:t>
                         </m:r>
                       </m:sub>
@@ -7608,26 +7599,36 @@
                     <m:sSub>
                       <m:sSubPr>
                         <m:ctrlPr>
-                          <a:rPr lang="en-US" b="1" i="1" smtClean="0"/>
+                          <a:rPr lang="en-US" b="1" i="1" smtClean="0">
+                            <a:latin typeface="Cambria Math" panose="02040503050406030204" pitchFamily="18" charset="0"/>
+                          </a:rPr>
                         </m:ctrlPr>
                       </m:sSubPr>
                       <m:e>
                         <m:r>
-                          <a:rPr lang="en-US" b="1" i="1"/>
+                          <a:rPr lang="en-US" b="1" i="1">
+                            <a:latin typeface="Cambria Math" panose="02040503050406030204" pitchFamily="18" charset="0"/>
+                          </a:rPr>
                           <m:t>𝑹</m:t>
                         </m:r>
                       </m:e>
                       <m:sub>
                         <m:r>
-                          <a:rPr lang="en-US" b="1" i="1"/>
+                          <a:rPr lang="en-US" b="1" i="1">
+                            <a:latin typeface="Cambria Math" panose="02040503050406030204" pitchFamily="18" charset="0"/>
+                          </a:rPr>
                           <m:t>𝒖</m:t>
                         </m:r>
                         <m:r>
-                          <a:rPr lang="en-US" b="1" i="1"/>
+                          <a:rPr lang="en-US" b="1" i="1">
+                            <a:latin typeface="Cambria Math" panose="02040503050406030204" pitchFamily="18" charset="0"/>
+                          </a:rPr>
                           <m:t>,</m:t>
                         </m:r>
                         <m:r>
-                          <a:rPr lang="en-US" b="1" i="1"/>
+                          <a:rPr lang="en-US" b="1" i="1">
+                            <a:latin typeface="Cambria Math" panose="02040503050406030204" pitchFamily="18" charset="0"/>
+                          </a:rPr>
                           <m:t>𝑵</m:t>
                         </m:r>
                       </m:sub>
@@ -7719,7 +7720,7 @@
             </p:txBody>
           </p:sp>
         </mc:Choice>
-        <mc:Fallback>
+        <mc:Fallback xmlns="">
           <p:sp>
             <p:nvSpPr>
               <p:cNvPr id="3" name="TextBox 2"/>
@@ -9287,14 +9288,7 @@
                 <a:latin typeface="Browallia New" panose="020B0604020202020204" pitchFamily="34" charset="-34"/>
                 <a:cs typeface="Browallia New" panose="020B0604020202020204" pitchFamily="34" charset="-34"/>
               </a:rPr>
-              <a:t>E-commerce yang menjual produk kebutuhan harian berkembang di beberapa negara (India, Turki, Australia, USA, UK dan Indonesia</a:t>
-            </a:r>
-            <a:r>
-              <a:rPr lang="id-ID" sz="2800" dirty="0" smtClean="0">
-                <a:latin typeface="Browallia New" panose="020B0604020202020204" pitchFamily="34" charset="-34"/>
-                <a:cs typeface="Browallia New" panose="020B0604020202020204" pitchFamily="34" charset="-34"/>
-              </a:rPr>
-              <a:t>).</a:t>
+              <a:t>E-commerce yang menjual produk kebutuhan harian berkembang di beberapa negara (India, Turki, Australia, USA, UK dan Indonesia).</a:t>
             </a:r>
             <a:endParaRPr lang="en-US" sz="2800" dirty="0" smtClean="0">
               <a:latin typeface="Browallia New" panose="020B0604020202020204" pitchFamily="34" charset="-34"/>
@@ -9320,10 +9314,6 @@
               </a:rPr>
               <a:t>).</a:t>
             </a:r>
-            <a:endParaRPr lang="id-ID" sz="2800" dirty="0" smtClean="0">
-              <a:latin typeface="Browallia New" panose="020B0604020202020204" pitchFamily="34" charset="-34"/>
-              <a:cs typeface="Browallia New" panose="020B0604020202020204" pitchFamily="34" charset="-34"/>
-            </a:endParaRPr>
           </a:p>
           <a:p>
             <a:pPr marL="363538" indent="-363538">
@@ -9342,14 +9332,7 @@
                 <a:latin typeface="Browallia New" panose="020B0604020202020204" pitchFamily="34" charset="-34"/>
                 <a:cs typeface="Browallia New" panose="020B0604020202020204" pitchFamily="34" charset="-34"/>
               </a:rPr>
-              <a:t>[14</a:t>
-            </a:r>
-            <a:r>
-              <a:rPr lang="id-ID" sz="1800" dirty="0" smtClean="0">
-                <a:latin typeface="Browallia New" panose="020B0604020202020204" pitchFamily="34" charset="-34"/>
-                <a:cs typeface="Browallia New" panose="020B0604020202020204" pitchFamily="34" charset="-34"/>
-              </a:rPr>
-              <a:t>]</a:t>
+              <a:t>[14]</a:t>
             </a:r>
             <a:r>
               <a:rPr lang="id-ID" sz="2800" dirty="0" smtClean="0">
@@ -10342,11 +10325,6 @@
                         </a:rPr>
                         <a:t>”</a:t>
                       </a:r>
-                      <a:endParaRPr lang="en-GB" sz="2400" dirty="0" smtClean="0">
-                        <a:latin typeface="Browallia New" panose="020B0604020202020204" pitchFamily="34" charset="-34"/>
-                        <a:ea typeface="Times New Roman" panose="02020603050405020304" pitchFamily="18" charset="0"/>
-                        <a:cs typeface="Browallia New" panose="020B0604020202020204" pitchFamily="34" charset="-34"/>
-                      </a:endParaRPr>
                     </a:p>
                   </a:txBody>
                   <a:tcPr marL="30475" marR="30475" marT="0" marB="0"/>
@@ -11683,8 +11661,8 @@
           </a:p>
         </p:txBody>
       </p:sp>
-      <mc:AlternateContent xmlns:mc="http://schemas.openxmlformats.org/markup-compatibility/2006">
-        <mc:Choice xmlns:a14="http://schemas.microsoft.com/office/drawing/2010/main" Requires="a14">
+      <mc:AlternateContent xmlns:mc="http://schemas.openxmlformats.org/markup-compatibility/2006" xmlns:a14="http://schemas.microsoft.com/office/drawing/2010/main">
+        <mc:Choice Requires="a14">
           <p:sp>
             <p:nvSpPr>
               <p:cNvPr id="6" name="Content Placeholder 5"/>
@@ -11786,28 +11764,38 @@
                     </m:oMathParaPr>
                     <m:oMath xmlns:m="http://schemas.openxmlformats.org/officeDocument/2006/math">
                       <m:r>
-                        <a:rPr lang="en-GB" sz="2800" i="1"/>
+                        <a:rPr lang="en-GB" sz="2800" i="1">
+                          <a:latin typeface="Cambria Math" panose="02040503050406030204" pitchFamily="18" charset="0"/>
+                        </a:rPr>
                         <m:t>𝑀𝐴𝐸</m:t>
                       </m:r>
                       <m:r>
-                        <a:rPr lang="en-GB" sz="2800" i="1"/>
+                        <a:rPr lang="en-GB" sz="2800" i="1">
+                          <a:latin typeface="Cambria Math" panose="02040503050406030204" pitchFamily="18" charset="0"/>
+                        </a:rPr>
                         <m:t>= </m:t>
                       </m:r>
                       <m:f>
                         <m:fPr>
                           <m:ctrlPr>
-                            <a:rPr lang="en-US" sz="2800" i="1"/>
+                            <a:rPr lang="en-US" sz="2800" i="1">
+                              <a:latin typeface="Cambria Math" panose="02040503050406030204" pitchFamily="18" charset="0"/>
+                            </a:rPr>
                           </m:ctrlPr>
                         </m:fPr>
                         <m:num>
                           <m:r>
-                            <a:rPr lang="en-GB" sz="2800" i="1"/>
+                            <a:rPr lang="en-GB" sz="2800" i="1">
+                              <a:latin typeface="Cambria Math" panose="02040503050406030204" pitchFamily="18" charset="0"/>
+                            </a:rPr>
                             <m:t>1</m:t>
                           </m:r>
                         </m:num>
                         <m:den>
                           <m:r>
-                            <a:rPr lang="en-GB" sz="2800" i="1"/>
+                            <a:rPr lang="en-GB" sz="2800" i="1">
+                              <a:latin typeface="Cambria Math" panose="02040503050406030204" pitchFamily="18" charset="0"/>
+                            </a:rPr>
                             <m:t>𝑛</m:t>
                           </m:r>
                         </m:den>
@@ -11817,97 +11805,131 @@
                           <m:chr m:val="∑"/>
                           <m:limLoc m:val="undOvr"/>
                           <m:ctrlPr>
-                            <a:rPr lang="en-US" sz="2800" i="1"/>
+                            <a:rPr lang="en-US" sz="2800" i="1">
+                              <a:latin typeface="Cambria Math" panose="02040503050406030204" pitchFamily="18" charset="0"/>
+                            </a:rPr>
                           </m:ctrlPr>
                         </m:naryPr>
                         <m:sub>
                           <m:r>
-                            <a:rPr lang="en-GB" sz="2800" i="1"/>
+                            <a:rPr lang="en-GB" sz="2800" i="1">
+                              <a:latin typeface="Cambria Math" panose="02040503050406030204" pitchFamily="18" charset="0"/>
+                            </a:rPr>
                             <m:t>𝑖</m:t>
                           </m:r>
                           <m:r>
-                            <a:rPr lang="en-GB" sz="2800" i="1"/>
+                            <a:rPr lang="en-GB" sz="2800" i="1">
+                              <a:latin typeface="Cambria Math" panose="02040503050406030204" pitchFamily="18" charset="0"/>
+                            </a:rPr>
                             <m:t>=1</m:t>
                           </m:r>
                         </m:sub>
                         <m:sup>
                           <m:r>
-                            <a:rPr lang="en-GB" sz="2800" i="1"/>
+                            <a:rPr lang="en-GB" sz="2800" i="1">
+                              <a:latin typeface="Cambria Math" panose="02040503050406030204" pitchFamily="18" charset="0"/>
+                            </a:rPr>
                             <m:t>𝑛</m:t>
                           </m:r>
                         </m:sup>
                         <m:e>
                           <m:r>
-                            <a:rPr lang="en-GB" sz="2800" i="1"/>
+                            <a:rPr lang="en-GB" sz="2800" i="1">
+                              <a:latin typeface="Cambria Math" panose="02040503050406030204" pitchFamily="18" charset="0"/>
+                            </a:rPr>
                             <m:t>|</m:t>
                           </m:r>
                           <m:sSub>
                             <m:sSubPr>
                               <m:ctrlPr>
-                                <a:rPr lang="en-US" sz="2800" i="1"/>
+                                <a:rPr lang="en-US" sz="2800" i="1">
+                                  <a:latin typeface="Cambria Math" panose="02040503050406030204" pitchFamily="18" charset="0"/>
+                                </a:rPr>
                               </m:ctrlPr>
                             </m:sSubPr>
                             <m:e>
                               <m:r>
-                                <a:rPr lang="en-GB" sz="2800" i="1"/>
+                                <a:rPr lang="en-GB" sz="2800" i="1">
+                                  <a:latin typeface="Cambria Math" panose="02040503050406030204" pitchFamily="18" charset="0"/>
+                                </a:rPr>
                                 <m:t>𝑓</m:t>
                               </m:r>
                             </m:e>
                             <m:sub>
                               <m:r>
-                                <a:rPr lang="en-GB" sz="2800" i="1"/>
+                                <a:rPr lang="en-GB" sz="2800" i="1">
+                                  <a:latin typeface="Cambria Math" panose="02040503050406030204" pitchFamily="18" charset="0"/>
+                                </a:rPr>
                                 <m:t>𝑖</m:t>
                               </m:r>
                             </m:sub>
                           </m:sSub>
                           <m:r>
-                            <a:rPr lang="en-GB" sz="2800" i="1"/>
+                            <a:rPr lang="en-GB" sz="2800" i="1">
+                              <a:latin typeface="Cambria Math" panose="02040503050406030204" pitchFamily="18" charset="0"/>
+                            </a:rPr>
                             <m:t>−</m:t>
                           </m:r>
                           <m:sSub>
                             <m:sSubPr>
                               <m:ctrlPr>
-                                <a:rPr lang="en-US" sz="2800" i="1"/>
+                                <a:rPr lang="en-US" sz="2800" i="1">
+                                  <a:latin typeface="Cambria Math" panose="02040503050406030204" pitchFamily="18" charset="0"/>
+                                </a:rPr>
                               </m:ctrlPr>
                             </m:sSubPr>
                             <m:e>
                               <m:r>
-                                <a:rPr lang="en-GB" sz="2800" i="1"/>
+                                <a:rPr lang="en-GB" sz="2800" i="1">
+                                  <a:latin typeface="Cambria Math" panose="02040503050406030204" pitchFamily="18" charset="0"/>
+                                </a:rPr>
                                 <m:t>𝑦</m:t>
                               </m:r>
                             </m:e>
                             <m:sub>
                               <m:r>
-                                <a:rPr lang="en-GB" sz="2800" i="1"/>
+                                <a:rPr lang="en-GB" sz="2800" i="1">
+                                  <a:latin typeface="Cambria Math" panose="02040503050406030204" pitchFamily="18" charset="0"/>
+                                </a:rPr>
                                 <m:t>𝑖</m:t>
                               </m:r>
                             </m:sub>
                           </m:sSub>
                           <m:r>
-                            <a:rPr lang="en-GB" sz="2800" i="1"/>
+                            <a:rPr lang="en-GB" sz="2800" i="1">
+                              <a:latin typeface="Cambria Math" panose="02040503050406030204" pitchFamily="18" charset="0"/>
+                            </a:rPr>
                             <m:t>|</m:t>
                           </m:r>
                         </m:e>
                       </m:nary>
                       <m:r>
-                        <a:rPr lang="en-GB" sz="2800" i="1"/>
+                        <a:rPr lang="en-GB" sz="2800" i="1">
+                          <a:latin typeface="Cambria Math" panose="02040503050406030204" pitchFamily="18" charset="0"/>
+                        </a:rPr>
                         <m:t>= </m:t>
                       </m:r>
                       <m:f>
                         <m:fPr>
                           <m:ctrlPr>
-                            <a:rPr lang="en-US" sz="2800" i="1"/>
+                            <a:rPr lang="en-US" sz="2800" i="1">
+                              <a:latin typeface="Cambria Math" panose="02040503050406030204" pitchFamily="18" charset="0"/>
+                            </a:rPr>
                           </m:ctrlPr>
                         </m:fPr>
                         <m:num>
                           <m:r>
-                            <a:rPr lang="en-GB" sz="2800" i="1"/>
+                            <a:rPr lang="en-GB" sz="2800" i="1">
+                              <a:latin typeface="Cambria Math" panose="02040503050406030204" pitchFamily="18" charset="0"/>
+                            </a:rPr>
                             <m:t>1</m:t>
                           </m:r>
                         </m:num>
                         <m:den>
                           <m:r>
-                            <a:rPr lang="en-GB" sz="2800" i="1"/>
+                            <a:rPr lang="en-GB" sz="2800" i="1">
+                              <a:latin typeface="Cambria Math" panose="02040503050406030204" pitchFamily="18" charset="0"/>
+                            </a:rPr>
                             <m:t>𝑛</m:t>
                           </m:r>
                         </m:den>
@@ -11917,57 +11939,77 @@
                           <m:chr m:val="∑"/>
                           <m:limLoc m:val="undOvr"/>
                           <m:ctrlPr>
-                            <a:rPr lang="en-US" sz="2800" i="1"/>
+                            <a:rPr lang="en-US" sz="2800" i="1">
+                              <a:latin typeface="Cambria Math" panose="02040503050406030204" pitchFamily="18" charset="0"/>
+                            </a:rPr>
                           </m:ctrlPr>
                         </m:naryPr>
                         <m:sub>
                           <m:r>
-                            <a:rPr lang="en-GB" sz="2800" i="1"/>
+                            <a:rPr lang="en-GB" sz="2800" i="1">
+                              <a:latin typeface="Cambria Math" panose="02040503050406030204" pitchFamily="18" charset="0"/>
+                            </a:rPr>
                             <m:t>𝑖</m:t>
                           </m:r>
                           <m:r>
-                            <a:rPr lang="en-GB" sz="2800" i="1"/>
+                            <a:rPr lang="en-GB" sz="2800" i="1">
+                              <a:latin typeface="Cambria Math" panose="02040503050406030204" pitchFamily="18" charset="0"/>
+                            </a:rPr>
                             <m:t>=1</m:t>
                           </m:r>
                         </m:sub>
                         <m:sup>
                           <m:r>
-                            <a:rPr lang="en-GB" sz="2800" i="1"/>
+                            <a:rPr lang="en-GB" sz="2800" i="1">
+                              <a:latin typeface="Cambria Math" panose="02040503050406030204" pitchFamily="18" charset="0"/>
+                            </a:rPr>
                             <m:t>𝑛</m:t>
                           </m:r>
                         </m:sup>
                         <m:e>
                           <m:r>
-                            <a:rPr lang="en-GB" sz="2800" i="1"/>
+                            <a:rPr lang="en-GB" sz="2800" i="1">
+                              <a:latin typeface="Cambria Math" panose="02040503050406030204" pitchFamily="18" charset="0"/>
+                            </a:rPr>
                             <m:t>|</m:t>
                           </m:r>
                           <m:sSub>
                             <m:sSubPr>
                               <m:ctrlPr>
-                                <a:rPr lang="en-US" sz="2800" i="1"/>
+                                <a:rPr lang="en-US" sz="2800" i="1">
+                                  <a:latin typeface="Cambria Math" panose="02040503050406030204" pitchFamily="18" charset="0"/>
+                                </a:rPr>
                               </m:ctrlPr>
                             </m:sSubPr>
                             <m:e>
                               <m:r>
-                                <a:rPr lang="en-GB" sz="2800" i="1"/>
+                                <a:rPr lang="en-GB" sz="2800" i="1">
+                                  <a:latin typeface="Cambria Math" panose="02040503050406030204" pitchFamily="18" charset="0"/>
+                                </a:rPr>
                                 <m:t>𝑒</m:t>
                               </m:r>
                             </m:e>
                             <m:sub>
                               <m:r>
-                                <a:rPr lang="en-GB" sz="2800" i="1"/>
+                                <a:rPr lang="en-GB" sz="2800" i="1">
+                                  <a:latin typeface="Cambria Math" panose="02040503050406030204" pitchFamily="18" charset="0"/>
+                                </a:rPr>
                                 <m:t>𝑖</m:t>
                               </m:r>
                             </m:sub>
                           </m:sSub>
                           <m:r>
-                            <a:rPr lang="en-GB" sz="2800" i="1"/>
+                            <a:rPr lang="en-GB" sz="2800" i="1">
+                              <a:latin typeface="Cambria Math" panose="02040503050406030204" pitchFamily="18" charset="0"/>
+                            </a:rPr>
                             <m:t>|</m:t>
                           </m:r>
                         </m:e>
                       </m:nary>
                       <m:r>
-                        <a:rPr lang="en-GB" sz="2800" i="1"/>
+                        <a:rPr lang="en-GB" sz="2800" i="1">
+                          <a:latin typeface="Cambria Math" panose="02040503050406030204" pitchFamily="18" charset="0"/>
+                        </a:rPr>
                         <m:t> </m:t>
                       </m:r>
                     </m:oMath>
@@ -11999,41 +12041,55 @@
                     <m:sSub>
                       <m:sSubPr>
                         <m:ctrlPr>
-                          <a:rPr lang="en-US" b="1" i="1"/>
+                          <a:rPr lang="en-US" b="1" i="1">
+                            <a:latin typeface="Cambria Math" panose="02040503050406030204" pitchFamily="18" charset="0"/>
+                          </a:rPr>
                         </m:ctrlPr>
                       </m:sSubPr>
                       <m:e>
                         <m:r>
-                          <a:rPr lang="en-GB" b="1" i="1"/>
+                          <a:rPr lang="en-GB" b="1" i="1">
+                            <a:latin typeface="Cambria Math" panose="02040503050406030204" pitchFamily="18" charset="0"/>
+                          </a:rPr>
                           <m:t>𝒇</m:t>
                         </m:r>
                       </m:e>
                       <m:sub>
                         <m:r>
-                          <a:rPr lang="en-GB" b="1" i="1"/>
+                          <a:rPr lang="en-GB" b="1" i="1">
+                            <a:latin typeface="Cambria Math" panose="02040503050406030204" pitchFamily="18" charset="0"/>
+                          </a:rPr>
                           <m:t>𝒊</m:t>
                         </m:r>
                       </m:sub>
                     </m:sSub>
                     <m:r>
-                      <a:rPr lang="en-GB" b="1" i="1"/>
+                      <a:rPr lang="en-GB" b="1" i="1">
+                        <a:latin typeface="Cambria Math" panose="02040503050406030204" pitchFamily="18" charset="0"/>
+                      </a:rPr>
                       <m:t>− </m:t>
                     </m:r>
                     <m:sSub>
                       <m:sSubPr>
                         <m:ctrlPr>
-                          <a:rPr lang="en-US" b="1" i="1"/>
+                          <a:rPr lang="en-US" b="1" i="1">
+                            <a:latin typeface="Cambria Math" panose="02040503050406030204" pitchFamily="18" charset="0"/>
+                          </a:rPr>
                         </m:ctrlPr>
                       </m:sSubPr>
                       <m:e>
                         <m:r>
-                          <a:rPr lang="en-GB" b="1" i="1"/>
+                          <a:rPr lang="en-GB" b="1" i="1">
+                            <a:latin typeface="Cambria Math" panose="02040503050406030204" pitchFamily="18" charset="0"/>
+                          </a:rPr>
                           <m:t>𝒚</m:t>
                         </m:r>
                       </m:e>
                       <m:sub>
                         <m:r>
-                          <a:rPr lang="en-GB" b="1" i="1"/>
+                          <a:rPr lang="en-GB" b="1" i="1">
+                            <a:latin typeface="Cambria Math" panose="02040503050406030204" pitchFamily="18" charset="0"/>
+                          </a:rPr>
                           <m:t>𝒊</m:t>
                         </m:r>
                       </m:sub>
@@ -12066,18 +12122,24 @@
                     <m:sSub>
                       <m:sSubPr>
                         <m:ctrlPr>
-                          <a:rPr lang="en-US" b="1" i="1"/>
+                          <a:rPr lang="en-US" b="1" i="1">
+                            <a:latin typeface="Cambria Math" panose="02040503050406030204" pitchFamily="18" charset="0"/>
+                          </a:rPr>
                         </m:ctrlPr>
                       </m:sSubPr>
                       <m:e>
                         <m:r>
-                          <a:rPr lang="en-GB" b="1" i="1"/>
+                          <a:rPr lang="en-GB" b="1" i="1">
+                            <a:latin typeface="Cambria Math" panose="02040503050406030204" pitchFamily="18" charset="0"/>
+                          </a:rPr>
                           <m:t>𝒆</m:t>
                         </m:r>
                       </m:e>
                       <m:sub>
                         <m:r>
-                          <a:rPr lang="en-GB" b="1" i="1"/>
+                          <a:rPr lang="en-GB" b="1" i="1">
+                            <a:latin typeface="Cambria Math" panose="02040503050406030204" pitchFamily="18" charset="0"/>
+                          </a:rPr>
                           <m:t>𝒊</m:t>
                         </m:r>
                       </m:sub>
@@ -12258,7 +12320,7 @@
             </p:txBody>
           </p:sp>
         </mc:Choice>
-        <mc:Fallback>
+        <mc:Fallback xmlns="">
           <p:sp>
             <p:nvSpPr>
               <p:cNvPr id="6" name="Content Placeholder 5"/>
@@ -18685,35 +18747,21 @@
                 <a:latin typeface="Browallia New" panose="020B0604020202020204" pitchFamily="34" charset="-34"/>
                 <a:cs typeface="Browallia New" panose="020B0604020202020204" pitchFamily="34" charset="-34"/>
               </a:rPr>
-              <a:t>Mencakup tahap </a:t>
+              <a:t>Mencakup tahap per</a:t>
+            </a:r>
+            <a:r>
+              <a:rPr lang="en-US" sz="3200" dirty="0" smtClean="0">
+                <a:latin typeface="Browallia New" panose="020B0604020202020204" pitchFamily="34" charset="-34"/>
+                <a:cs typeface="Browallia New" panose="020B0604020202020204" pitchFamily="34" charset="-34"/>
+              </a:rPr>
+              <a:t>e</a:t>
             </a:r>
             <a:r>
               <a:rPr lang="id-ID" sz="3200" dirty="0" smtClean="0">
                 <a:latin typeface="Browallia New" panose="020B0604020202020204" pitchFamily="34" charset="-34"/>
                 <a:cs typeface="Browallia New" panose="020B0604020202020204" pitchFamily="34" charset="-34"/>
               </a:rPr>
-              <a:t>per</a:t>
-            </a:r>
-            <a:r>
-              <a:rPr lang="en-US" sz="3200" dirty="0" smtClean="0">
-                <a:latin typeface="Browallia New" panose="020B0604020202020204" pitchFamily="34" charset="-34"/>
-                <a:cs typeface="Browallia New" panose="020B0604020202020204" pitchFamily="34" charset="-34"/>
-              </a:rPr>
-              <a:t>e</a:t>
-            </a:r>
-            <a:r>
-              <a:rPr lang="id-ID" sz="3200" dirty="0" smtClean="0">
-                <a:latin typeface="Browallia New" panose="020B0604020202020204" pitchFamily="34" charset="-34"/>
-                <a:cs typeface="Browallia New" panose="020B0604020202020204" pitchFamily="34" charset="-34"/>
-              </a:rPr>
-              <a:t>ncanaan</a:t>
-            </a:r>
-            <a:r>
-              <a:rPr lang="id-ID" sz="3200" dirty="0" smtClean="0">
-                <a:latin typeface="Browallia New" panose="020B0604020202020204" pitchFamily="34" charset="-34"/>
-                <a:cs typeface="Browallia New" panose="020B0604020202020204" pitchFamily="34" charset="-34"/>
-              </a:rPr>
-              <a:t>, desain sistem, implementasi serta evaluasi.</a:t>
+              <a:t>ncanaan, desain sistem, implementasi serta evaluasi.</a:t>
             </a:r>
           </a:p>
           <a:p>
@@ -19210,10 +19258,6 @@
               </a:rPr>
               <a:t>e-commerce</a:t>
             </a:r>
-            <a:endParaRPr lang="en-US" sz="3200" i="1" dirty="0" smtClean="0">
-              <a:latin typeface="Browallia New" panose="020B0604020202020204" pitchFamily="34" charset="-34"/>
-              <a:cs typeface="Browallia New" panose="020B0604020202020204" pitchFamily="34" charset="-34"/>
-            </a:endParaRPr>
           </a:p>
           <a:p>
             <a:pPr marL="363538" indent="-363538">
@@ -19225,14 +19269,7 @@
                 <a:latin typeface="Browallia New" panose="020B0604020202020204" pitchFamily="34" charset="-34"/>
                 <a:cs typeface="Browallia New" panose="020B0604020202020204" pitchFamily="34" charset="-34"/>
               </a:rPr>
-              <a:t>Evaluasi </a:t>
-            </a:r>
-            <a:r>
-              <a:rPr lang="id-ID" sz="3200" dirty="0" smtClean="0">
-                <a:latin typeface="Browallia New" panose="020B0604020202020204" pitchFamily="34" charset="-34"/>
-                <a:cs typeface="Browallia New" panose="020B0604020202020204" pitchFamily="34" charset="-34"/>
-              </a:rPr>
-              <a:t>dilakukan dengan memastikan ketepatan sistem rekomendasi dalam memberikan saran produk yang aman atau baik dikonsumsi.</a:t>
+              <a:t>Evaluasi dilakukan dengan memastikan ketepatan sistem rekomendasi dalam memberikan saran produk yang aman atau baik dikonsumsi.</a:t>
             </a:r>
           </a:p>
           <a:p>
@@ -19536,28 +19573,14 @@
                 <a:latin typeface="Browallia New" panose="020B0604020202020204" pitchFamily="34" charset="-34"/>
                 <a:cs typeface="Browallia New" panose="020B0604020202020204" pitchFamily="34" charset="-34"/>
               </a:rPr>
-              <a:t>rat</a:t>
-            </a:r>
-            <a:r>
-              <a:rPr lang="en-US" sz="2400" dirty="0" smtClean="0">
-                <a:latin typeface="Browallia New" panose="020B0604020202020204" pitchFamily="34" charset="-34"/>
-                <a:cs typeface="Browallia New" panose="020B0604020202020204" pitchFamily="34" charset="-34"/>
-              </a:rPr>
-              <a:t>ed</a:t>
+              <a:t>rated</a:t>
             </a:r>
             <a:r>
               <a:rPr lang="id-ID" sz="2400" dirty="0" smtClean="0">
                 <a:latin typeface="Browallia New" panose="020B0604020202020204" pitchFamily="34" charset="-34"/>
                 <a:cs typeface="Browallia New" panose="020B0604020202020204" pitchFamily="34" charset="-34"/>
               </a:rPr>
-              <a:t> </a:t>
-            </a:r>
-            <a:r>
-              <a:rPr lang="id-ID" sz="2400" dirty="0" smtClean="0">
-                <a:latin typeface="Browallia New" panose="020B0604020202020204" pitchFamily="34" charset="-34"/>
-                <a:cs typeface="Browallia New" panose="020B0604020202020204" pitchFamily="34" charset="-34"/>
-              </a:rPr>
-              <a:t>I1</a:t>
+              <a:t> I1</a:t>
             </a:r>
           </a:p>
           <a:p>
@@ -19583,28 +19606,14 @@
                 <a:latin typeface="Browallia New" panose="020B0604020202020204" pitchFamily="34" charset="-34"/>
                 <a:cs typeface="Browallia New" panose="020B0604020202020204" pitchFamily="34" charset="-34"/>
               </a:rPr>
-              <a:t>rat</a:t>
-            </a:r>
-            <a:r>
-              <a:rPr lang="en-US" sz="2400" dirty="0" smtClean="0">
-                <a:latin typeface="Browallia New" panose="020B0604020202020204" pitchFamily="34" charset="-34"/>
-                <a:cs typeface="Browallia New" panose="020B0604020202020204" pitchFamily="34" charset="-34"/>
-              </a:rPr>
-              <a:t>ed</a:t>
+              <a:t>rated</a:t>
             </a:r>
             <a:r>
               <a:rPr lang="id-ID" sz="2400" dirty="0" smtClean="0">
                 <a:latin typeface="Browallia New" panose="020B0604020202020204" pitchFamily="34" charset="-34"/>
                 <a:cs typeface="Browallia New" panose="020B0604020202020204" pitchFamily="34" charset="-34"/>
               </a:rPr>
-              <a:t> </a:t>
-            </a:r>
-            <a:r>
-              <a:rPr lang="id-ID" sz="2400" dirty="0" smtClean="0">
-                <a:latin typeface="Browallia New" panose="020B0604020202020204" pitchFamily="34" charset="-34"/>
-                <a:cs typeface="Browallia New" panose="020B0604020202020204" pitchFamily="34" charset="-34"/>
-              </a:rPr>
-              <a:t>by customer C</a:t>
+              <a:t> by customer C</a:t>
             </a:r>
           </a:p>
           <a:p>
@@ -19630,28 +19639,14 @@
                 <a:latin typeface="Browallia New" panose="020B0604020202020204" pitchFamily="34" charset="-34"/>
                 <a:cs typeface="Browallia New" panose="020B0604020202020204" pitchFamily="34" charset="-34"/>
               </a:rPr>
-              <a:t>rat</a:t>
-            </a:r>
-            <a:r>
-              <a:rPr lang="en-US" sz="2400" dirty="0" smtClean="0">
-                <a:latin typeface="Browallia New" panose="020B0604020202020204" pitchFamily="34" charset="-34"/>
-                <a:cs typeface="Browallia New" panose="020B0604020202020204" pitchFamily="34" charset="-34"/>
-              </a:rPr>
-              <a:t>ed</a:t>
+              <a:t>rated</a:t>
             </a:r>
             <a:r>
               <a:rPr lang="id-ID" sz="2400" dirty="0" smtClean="0">
                 <a:latin typeface="Browallia New" panose="020B0604020202020204" pitchFamily="34" charset="-34"/>
                 <a:cs typeface="Browallia New" panose="020B0604020202020204" pitchFamily="34" charset="-34"/>
               </a:rPr>
-              <a:t> </a:t>
-            </a:r>
-            <a:r>
-              <a:rPr lang="id-ID" sz="2400" dirty="0" smtClean="0">
-                <a:latin typeface="Browallia New" panose="020B0604020202020204" pitchFamily="34" charset="-34"/>
-                <a:cs typeface="Browallia New" panose="020B0604020202020204" pitchFamily="34" charset="-34"/>
-              </a:rPr>
-              <a:t>I1 and I2</a:t>
+              <a:t> I1 and I2</a:t>
             </a:r>
           </a:p>
           <a:p>
@@ -20220,14 +20215,7 @@
                 <a:latin typeface="Browallia New" panose="020B0604020202020204" pitchFamily="34" charset="-34"/>
                 <a:cs typeface="Browallia New" panose="020B0604020202020204" pitchFamily="34" charset="-34"/>
               </a:rPr>
-              <a:t>Evaluasi </a:t>
-            </a:r>
-            <a:r>
-              <a:rPr lang="id-ID" sz="2800" dirty="0" smtClean="0">
-                <a:latin typeface="Browallia New" panose="020B0604020202020204" pitchFamily="34" charset="-34"/>
-                <a:cs typeface="Browallia New" panose="020B0604020202020204" pitchFamily="34" charset="-34"/>
-              </a:rPr>
-              <a:t>: </a:t>
+              <a:t>Evaluasi : </a:t>
             </a:r>
             <a:r>
               <a:rPr lang="en-US" sz="2800" dirty="0" err="1" smtClean="0">

</xml_diff>